<commit_message>
translate bootstrap preentation to English
</commit_message>
<xml_diff>
--- a/bootstrap/bootstrap.pptx
+++ b/bootstrap/bootstrap.pptx
@@ -1483,7 +1483,7 @@
               <a:pPr>
                 <a:defRPr/>
               </a:pPr>
-              <a:t>10/10/2020</a:t>
+              <a:t>21/10/2020</a:t>
             </a:fld>
             <a:endParaRPr lang="en-GB"/>
           </a:p>
@@ -1888,7 +1888,7 @@
           <p:cNvPr id="8" name="Picture 7">
             <a:extLst>
               <a:ext uri="{FF2B5EF4-FFF2-40B4-BE49-F238E27FC236}">
-                <a16:creationId xmlns:a16="http://schemas.microsoft.com/office/drawing/2014/main" xmlns="" id="{1CF45043-0DF6-7844-A454-194D648F98F1}"/>
+                <a16:creationId xmlns="" xmlns:a16="http://schemas.microsoft.com/office/drawing/2014/main" id="{1CF45043-0DF6-7844-A454-194D648F98F1}"/>
               </a:ext>
             </a:extLst>
           </p:cNvPr>
@@ -1918,7 +1918,7 @@
           <p:cNvPr id="10" name="Title 8">
             <a:extLst>
               <a:ext uri="{FF2B5EF4-FFF2-40B4-BE49-F238E27FC236}">
-                <a16:creationId xmlns:a16="http://schemas.microsoft.com/office/drawing/2014/main" xmlns="" id="{353C5CCE-34CF-4745-B8D7-AF744DB56245}"/>
+                <a16:creationId xmlns="" xmlns:a16="http://schemas.microsoft.com/office/drawing/2014/main" id="{353C5CCE-34CF-4745-B8D7-AF744DB56245}"/>
               </a:ext>
             </a:extLst>
           </p:cNvPr>
@@ -2629,7 +2629,7 @@
           <p:cNvPr id="10" name="Title 1">
             <a:extLst>
               <a:ext uri="{FF2B5EF4-FFF2-40B4-BE49-F238E27FC236}">
-                <a16:creationId xmlns:a16="http://schemas.microsoft.com/office/drawing/2014/main" xmlns="" id="{B4B68A2E-49F8-4BDA-BD1A-488169336555}"/>
+                <a16:creationId xmlns="" xmlns:a16="http://schemas.microsoft.com/office/drawing/2014/main" id="{B4B68A2E-49F8-4BDA-BD1A-488169336555}"/>
               </a:ext>
             </a:extLst>
           </p:cNvPr>
@@ -2964,7 +2964,7 @@
           <p:cNvPr id="8" name="Picture 7">
             <a:extLst>
               <a:ext uri="{FF2B5EF4-FFF2-40B4-BE49-F238E27FC236}">
-                <a16:creationId xmlns:a16="http://schemas.microsoft.com/office/drawing/2014/main" xmlns="" id="{1CF45043-0DF6-7844-A454-194D648F98F1}"/>
+                <a16:creationId xmlns="" xmlns:a16="http://schemas.microsoft.com/office/drawing/2014/main" id="{1CF45043-0DF6-7844-A454-194D648F98F1}"/>
               </a:ext>
             </a:extLst>
           </p:cNvPr>
@@ -2994,7 +2994,7 @@
           <p:cNvPr id="10" name="Title 8">
             <a:extLst>
               <a:ext uri="{FF2B5EF4-FFF2-40B4-BE49-F238E27FC236}">
-                <a16:creationId xmlns:a16="http://schemas.microsoft.com/office/drawing/2014/main" xmlns="" id="{353C5CCE-34CF-4745-B8D7-AF744DB56245}"/>
+                <a16:creationId xmlns="" xmlns:a16="http://schemas.microsoft.com/office/drawing/2014/main" id="{353C5CCE-34CF-4745-B8D7-AF744DB56245}"/>
               </a:ext>
             </a:extLst>
           </p:cNvPr>
@@ -3209,7 +3209,7 @@
           <p:cNvPr id="7" name="Picture 6">
             <a:extLst>
               <a:ext uri="{FF2B5EF4-FFF2-40B4-BE49-F238E27FC236}">
-                <a16:creationId xmlns:a16="http://schemas.microsoft.com/office/drawing/2014/main" xmlns="" id="{19906801-963A-2748-A48D-2607EEFEA3B7}"/>
+                <a16:creationId xmlns="" xmlns:a16="http://schemas.microsoft.com/office/drawing/2014/main" id="{19906801-963A-2748-A48D-2607EEFEA3B7}"/>
               </a:ext>
             </a:extLst>
           </p:cNvPr>
@@ -3911,7 +3911,7 @@
           <p:cNvPr id="9" name="Picture 8">
             <a:extLst>
               <a:ext uri="{FF2B5EF4-FFF2-40B4-BE49-F238E27FC236}">
-                <a16:creationId xmlns:a16="http://schemas.microsoft.com/office/drawing/2014/main" xmlns="" id="{21C47469-3B03-E44C-89B5-F697BC2200BB}"/>
+                <a16:creationId xmlns="" xmlns:a16="http://schemas.microsoft.com/office/drawing/2014/main" id="{21C47469-3B03-E44C-89B5-F697BC2200BB}"/>
               </a:ext>
             </a:extLst>
           </p:cNvPr>
@@ -4362,7 +4362,7 @@
           <p:cNvPr id="7" name="Picture 6">
             <a:extLst>
               <a:ext uri="{FF2B5EF4-FFF2-40B4-BE49-F238E27FC236}">
-                <a16:creationId xmlns:a16="http://schemas.microsoft.com/office/drawing/2014/main" xmlns="" id="{19906801-963A-2748-A48D-2607EEFEA3B7}"/>
+                <a16:creationId xmlns="" xmlns:a16="http://schemas.microsoft.com/office/drawing/2014/main" id="{19906801-963A-2748-A48D-2607EEFEA3B7}"/>
               </a:ext>
             </a:extLst>
           </p:cNvPr>
@@ -5691,7 +5691,7 @@
           <p:cNvPr id="10" name="Title 1">
             <a:extLst>
               <a:ext uri="{FF2B5EF4-FFF2-40B4-BE49-F238E27FC236}">
-                <a16:creationId xmlns:a16="http://schemas.microsoft.com/office/drawing/2014/main" xmlns="" id="{B4B68A2E-49F8-4BDA-BD1A-488169336555}"/>
+                <a16:creationId xmlns="" xmlns:a16="http://schemas.microsoft.com/office/drawing/2014/main" id="{B4B68A2E-49F8-4BDA-BD1A-488169336555}"/>
               </a:ext>
             </a:extLst>
           </p:cNvPr>
@@ -5902,7 +5902,7 @@
           <p:cNvPr id="8" name="Picture 7">
             <a:extLst>
               <a:ext uri="{FF2B5EF4-FFF2-40B4-BE49-F238E27FC236}">
-                <a16:creationId xmlns:a16="http://schemas.microsoft.com/office/drawing/2014/main" xmlns="" id="{1CF45043-0DF6-7844-A454-194D648F98F1}"/>
+                <a16:creationId xmlns="" xmlns:a16="http://schemas.microsoft.com/office/drawing/2014/main" id="{1CF45043-0DF6-7844-A454-194D648F98F1}"/>
               </a:ext>
             </a:extLst>
           </p:cNvPr>
@@ -6063,7 +6063,7 @@
           <p:cNvPr id="7" name="Picture 6">
             <a:extLst>
               <a:ext uri="{FF2B5EF4-FFF2-40B4-BE49-F238E27FC236}">
-                <a16:creationId xmlns:a16="http://schemas.microsoft.com/office/drawing/2014/main" xmlns="" id="{19906801-963A-2748-A48D-2607EEFEA3B7}"/>
+                <a16:creationId xmlns="" xmlns:a16="http://schemas.microsoft.com/office/drawing/2014/main" id="{19906801-963A-2748-A48D-2607EEFEA3B7}"/>
               </a:ext>
             </a:extLst>
           </p:cNvPr>
@@ -6255,7 +6255,7 @@
           <p:cNvPr id="6" name="Text Placeholder 6">
             <a:extLst>
               <a:ext uri="{FF2B5EF4-FFF2-40B4-BE49-F238E27FC236}">
-                <a16:creationId xmlns:a16="http://schemas.microsoft.com/office/drawing/2014/main" xmlns="" id="{6DDF5AB6-195E-47F9-91E3-98E599C01EFB}"/>
+                <a16:creationId xmlns="" xmlns:a16="http://schemas.microsoft.com/office/drawing/2014/main" id="{6DDF5AB6-195E-47F9-91E3-98E599C01EFB}"/>
               </a:ext>
             </a:extLst>
           </p:cNvPr>
@@ -6553,7 +6553,7 @@
           <p:cNvPr id="9" name="Picture 8">
             <a:extLst>
               <a:ext uri="{FF2B5EF4-FFF2-40B4-BE49-F238E27FC236}">
-                <a16:creationId xmlns:a16="http://schemas.microsoft.com/office/drawing/2014/main" xmlns="" id="{320D1B1E-8401-8049-8729-0C74A6C1928C}"/>
+                <a16:creationId xmlns="" xmlns:a16="http://schemas.microsoft.com/office/drawing/2014/main" id="{320D1B1E-8401-8049-8729-0C74A6C1928C}"/>
               </a:ext>
             </a:extLst>
           </p:cNvPr>
@@ -6837,7 +6837,7 @@
           <p:cNvPr id="9" name="Rectangle 8">
             <a:extLst>
               <a:ext uri="{FF2B5EF4-FFF2-40B4-BE49-F238E27FC236}">
-                <a16:creationId xmlns:a16="http://schemas.microsoft.com/office/drawing/2014/main" xmlns="" id="{9CC0A6A9-FB31-4A19-A170-D23A18C938E0}"/>
+                <a16:creationId xmlns="" xmlns:a16="http://schemas.microsoft.com/office/drawing/2014/main" id="{9CC0A6A9-FB31-4A19-A170-D23A18C938E0}"/>
               </a:ext>
             </a:extLst>
           </p:cNvPr>
@@ -9422,7 +9422,7 @@
           <p:cNvPr id="22" name="Picture 21">
             <a:extLst>
               <a:ext uri="{FF2B5EF4-FFF2-40B4-BE49-F238E27FC236}">
-                <a16:creationId xmlns:a16="http://schemas.microsoft.com/office/drawing/2014/main" xmlns="" id="{D2C70A87-6824-3248-B448-307E7C5BC0C9}"/>
+                <a16:creationId xmlns="" xmlns:a16="http://schemas.microsoft.com/office/drawing/2014/main" id="{D2C70A87-6824-3248-B448-307E7C5BC0C9}"/>
               </a:ext>
             </a:extLst>
           </p:cNvPr>
@@ -9858,7 +9858,7 @@
           <p:cNvPr id="9" name="Picture 8">
             <a:extLst>
               <a:ext uri="{FF2B5EF4-FFF2-40B4-BE49-F238E27FC236}">
-                <a16:creationId xmlns:a16="http://schemas.microsoft.com/office/drawing/2014/main" xmlns="" id="{21C47469-3B03-E44C-89B5-F697BC2200BB}"/>
+                <a16:creationId xmlns="" xmlns:a16="http://schemas.microsoft.com/office/drawing/2014/main" id="{21C47469-3B03-E44C-89B5-F697BC2200BB}"/>
               </a:ext>
             </a:extLst>
           </p:cNvPr>
@@ -12320,7 +12320,7 @@
           <p:cNvPr id="10" name="Title 9">
             <a:extLst>
               <a:ext uri="{FF2B5EF4-FFF2-40B4-BE49-F238E27FC236}">
-                <a16:creationId xmlns:a16="http://schemas.microsoft.com/office/drawing/2014/main" xmlns="" id="{C2C01860-88AA-4983-9D84-DB6CD67B99FA}"/>
+                <a16:creationId xmlns="" xmlns:a16="http://schemas.microsoft.com/office/drawing/2014/main" id="{C2C01860-88AA-4983-9D84-DB6CD67B99FA}"/>
               </a:ext>
             </a:extLst>
           </p:cNvPr>
@@ -12349,7 +12349,7 @@
           <p:cNvPr id="11" name="Text Placeholder 10">
             <a:extLst>
               <a:ext uri="{FF2B5EF4-FFF2-40B4-BE49-F238E27FC236}">
-                <a16:creationId xmlns:a16="http://schemas.microsoft.com/office/drawing/2014/main" xmlns="" id="{CF3D1018-5EBF-47E8-BCA9-73CE5FFDDFC4}"/>
+                <a16:creationId xmlns="" xmlns:a16="http://schemas.microsoft.com/office/drawing/2014/main" id="{CF3D1018-5EBF-47E8-BCA9-73CE5FFDDFC4}"/>
               </a:ext>
             </a:extLst>
           </p:cNvPr>
@@ -12422,7 +12422,7 @@
         </p:nvSpPr>
         <p:spPr>
           <a:xfrm>
-            <a:off x="685800" y="957532"/>
+            <a:off x="401129" y="685801"/>
             <a:ext cx="5533845" cy="5063706"/>
           </a:xfrm>
         </p:spPr>
@@ -12431,465 +12431,49 @@
           <a:lstStyle/>
           <a:p>
             <a:r>
-              <a:rPr lang="ru-RU" dirty="0" err="1" smtClean="0"/>
-              <a:t>Це</a:t>
-            </a:r>
-            <a:r>
-              <a:rPr lang="ru-RU" dirty="0" smtClean="0"/>
-              <a:t> </a:t>
-            </a:r>
-            <a:r>
-              <a:rPr lang="ru-RU" dirty="0"/>
-              <a:t>CSS-</a:t>
-            </a:r>
-            <a:r>
-              <a:rPr lang="ru-RU" dirty="0" err="1"/>
-              <a:t>фреймворк</a:t>
-            </a:r>
-            <a:r>
-              <a:rPr lang="ru-RU" dirty="0"/>
-              <a:t>, </a:t>
-            </a:r>
-            <a:r>
-              <a:rPr lang="ru-RU" dirty="0" err="1" smtClean="0"/>
-              <a:t>створений</a:t>
-            </a:r>
-            <a:r>
-              <a:rPr lang="ru-RU" dirty="0" smtClean="0"/>
-              <a:t> </a:t>
-            </a:r>
-            <a:r>
-              <a:rPr lang="ru-RU" dirty="0"/>
-              <a:t>в </a:t>
-            </a:r>
-            <a:r>
-              <a:rPr lang="ru-RU" dirty="0" smtClean="0"/>
-              <a:t>першу </a:t>
-            </a:r>
-            <a:r>
-              <a:rPr lang="ru-RU" dirty="0" err="1" smtClean="0"/>
-              <a:t>чергу</a:t>
-            </a:r>
-            <a:r>
-              <a:rPr lang="ru-RU" dirty="0" smtClean="0"/>
-              <a:t> для </a:t>
-            </a:r>
-            <a:r>
-              <a:rPr lang="ru-RU" dirty="0" err="1" smtClean="0"/>
-              <a:t>швидкого</a:t>
-            </a:r>
-            <a:r>
-              <a:rPr lang="ru-RU" dirty="0" smtClean="0"/>
-              <a:t> </a:t>
-            </a:r>
-            <a:r>
-              <a:rPr lang="ru-RU" dirty="0" err="1" smtClean="0"/>
-              <a:t>створення</a:t>
-            </a:r>
-            <a:r>
-              <a:rPr lang="ru-RU" dirty="0" smtClean="0"/>
-              <a:t> </a:t>
-            </a:r>
-            <a:r>
-              <a:rPr lang="ru-RU" dirty="0" err="1" smtClean="0"/>
-              <a:t>користувацьких</a:t>
-            </a:r>
-            <a:r>
-              <a:rPr lang="ru-RU" dirty="0" smtClean="0"/>
-              <a:t> </a:t>
-            </a:r>
-            <a:r>
-              <a:rPr lang="ru-RU" dirty="0" err="1" smtClean="0"/>
-              <a:t>інтерфейсів</a:t>
-            </a:r>
-            <a:r>
-              <a:rPr lang="ru-RU" dirty="0" smtClean="0"/>
-              <a:t>. </a:t>
-            </a:r>
-            <a:r>
-              <a:rPr lang="ru-RU" dirty="0" err="1"/>
-              <a:t>Tailwind</a:t>
-            </a:r>
-            <a:r>
-              <a:rPr lang="ru-RU" dirty="0"/>
-              <a:t> </a:t>
-            </a:r>
-            <a:r>
-              <a:rPr lang="ru-RU" dirty="0" err="1" smtClean="0"/>
-              <a:t>відрізняється</a:t>
-            </a:r>
-            <a:r>
-              <a:rPr lang="ru-RU" dirty="0" smtClean="0"/>
-              <a:t> </a:t>
-            </a:r>
-            <a:r>
-              <a:rPr lang="ru-RU" dirty="0" err="1" smtClean="0"/>
-              <a:t>від</a:t>
-            </a:r>
-            <a:r>
-              <a:rPr lang="ru-RU" dirty="0" smtClean="0"/>
-              <a:t> </a:t>
-            </a:r>
-            <a:r>
-              <a:rPr lang="ru-RU" dirty="0" err="1" smtClean="0"/>
-              <a:t>фреймворків</a:t>
-            </a:r>
-            <a:r>
-              <a:rPr lang="ru-RU" dirty="0" smtClean="0"/>
-              <a:t>, </a:t>
-            </a:r>
-            <a:r>
-              <a:rPr lang="ru-RU" dirty="0"/>
-              <a:t>таких </a:t>
-            </a:r>
-            <a:r>
-              <a:rPr lang="ru-RU" dirty="0" smtClean="0"/>
-              <a:t>як </a:t>
-            </a:r>
-            <a:r>
-              <a:rPr lang="ru-RU" dirty="0" err="1"/>
-              <a:t>Bootstrap</a:t>
-            </a:r>
-            <a:r>
-              <a:rPr lang="ru-RU" dirty="0"/>
-              <a:t>, </a:t>
-            </a:r>
-            <a:r>
-              <a:rPr lang="ru-RU" dirty="0" err="1"/>
-              <a:t>Foundation</a:t>
-            </a:r>
-            <a:r>
-              <a:rPr lang="ru-RU" dirty="0"/>
-              <a:t> </a:t>
-            </a:r>
-            <a:r>
-              <a:rPr lang="ru-RU" dirty="0" err="1"/>
-              <a:t>ч</a:t>
-            </a:r>
-            <a:r>
-              <a:rPr lang="ru-RU" dirty="0" err="1" smtClean="0"/>
-              <a:t>и</a:t>
-            </a:r>
-            <a:r>
-              <a:rPr lang="ru-RU" dirty="0" smtClean="0"/>
-              <a:t> </a:t>
-            </a:r>
-            <a:r>
-              <a:rPr lang="ru-RU" dirty="0" err="1"/>
+              <a:rPr lang="en-US" sz="1800" dirty="0"/>
+              <a:t>Tailwind is different from frameworks like Bootstrap, Foundation, or </a:t>
+            </a:r>
+            <a:r>
+              <a:rPr lang="en-US" sz="1800" dirty="0" err="1"/>
               <a:t>Bulma</a:t>
             </a:r>
             <a:r>
-              <a:rPr lang="ru-RU" dirty="0"/>
-              <a:t>, </a:t>
-            </a:r>
-            <a:r>
-              <a:rPr lang="ru-RU" dirty="0" err="1" smtClean="0"/>
-              <a:t>тим</a:t>
-            </a:r>
-            <a:r>
-              <a:rPr lang="ru-RU" dirty="0"/>
-              <a:t>, </a:t>
-            </a:r>
-            <a:r>
-              <a:rPr lang="ru-RU" dirty="0" err="1" smtClean="0"/>
-              <a:t>що</a:t>
-            </a:r>
-            <a:r>
-              <a:rPr lang="ru-RU" dirty="0" smtClean="0"/>
-              <a:t> </a:t>
-            </a:r>
-            <a:r>
-              <a:rPr lang="ru-RU" dirty="0" err="1" smtClean="0"/>
-              <a:t>це</a:t>
-            </a:r>
-            <a:r>
-              <a:rPr lang="ru-RU" dirty="0" smtClean="0"/>
-              <a:t> </a:t>
-            </a:r>
-            <a:r>
-              <a:rPr lang="ru-RU" dirty="0"/>
-              <a:t>не </a:t>
-            </a:r>
-            <a:r>
-              <a:rPr lang="ru-RU" dirty="0" err="1" smtClean="0"/>
-              <a:t>набір</a:t>
-            </a:r>
-            <a:endParaRPr lang="ru-RU" dirty="0" smtClean="0"/>
-          </a:p>
-          <a:p>
-            <a:r>
-              <a:rPr lang="ru-RU" dirty="0" smtClean="0"/>
-              <a:t> </a:t>
-            </a:r>
-            <a:r>
-              <a:rPr lang="ru-RU" dirty="0"/>
-              <a:t>UI </a:t>
-            </a:r>
-            <a:r>
-              <a:rPr lang="ru-RU" dirty="0" err="1"/>
-              <a:t>kit</a:t>
-            </a:r>
-            <a:r>
-              <a:rPr lang="ru-RU" dirty="0"/>
-              <a:t>.</a:t>
-            </a:r>
-          </a:p>
-          <a:p>
-            <a:r>
-              <a:rPr lang="ru-RU" dirty="0"/>
-              <a:t>У </a:t>
-            </a:r>
-            <a:r>
-              <a:rPr lang="ru-RU" dirty="0" err="1" smtClean="0"/>
-              <a:t>нього</a:t>
-            </a:r>
-            <a:r>
-              <a:rPr lang="ru-RU" dirty="0" smtClean="0"/>
-              <a:t> </a:t>
-            </a:r>
-            <a:r>
-              <a:rPr lang="ru-RU" dirty="0" err="1" smtClean="0"/>
-              <a:t>немає</a:t>
-            </a:r>
-            <a:r>
-              <a:rPr lang="ru-RU" dirty="0" smtClean="0"/>
-              <a:t> </a:t>
-            </a:r>
-            <a:r>
-              <a:rPr lang="ru-RU" dirty="0"/>
-              <a:t>тем </a:t>
-            </a:r>
-            <a:r>
-              <a:rPr lang="ru-RU" dirty="0" smtClean="0"/>
-              <a:t>по </a:t>
-            </a:r>
-            <a:r>
-              <a:rPr lang="ru-RU" dirty="0" err="1" smtClean="0"/>
-              <a:t>замовчуванню</a:t>
-            </a:r>
-            <a:r>
-              <a:rPr lang="ru-RU" dirty="0" smtClean="0"/>
-              <a:t>, та </a:t>
-            </a:r>
-            <a:r>
-              <a:rPr lang="ru-RU" dirty="0" err="1" smtClean="0"/>
-              <a:t>немає</a:t>
-            </a:r>
-            <a:r>
-              <a:rPr lang="ru-RU" dirty="0" smtClean="0"/>
-              <a:t> </a:t>
-            </a:r>
-            <a:r>
-              <a:rPr lang="ru-RU" dirty="0" err="1" smtClean="0"/>
-              <a:t>вбудованих</a:t>
-            </a:r>
-            <a:r>
-              <a:rPr lang="ru-RU" dirty="0" smtClean="0"/>
-              <a:t> </a:t>
-            </a:r>
-            <a:r>
-              <a:rPr lang="ru-RU" dirty="0" err="1" smtClean="0"/>
-              <a:t>компонентів</a:t>
-            </a:r>
-            <a:r>
-              <a:rPr lang="ru-RU" dirty="0" smtClean="0"/>
-              <a:t> </a:t>
-            </a:r>
-            <a:r>
-              <a:rPr lang="ru-RU" dirty="0"/>
-              <a:t>для </a:t>
-            </a:r>
-            <a:r>
-              <a:rPr lang="ru-RU" dirty="0" err="1" smtClean="0"/>
-              <a:t>користувацького</a:t>
-            </a:r>
-            <a:r>
-              <a:rPr lang="ru-RU" dirty="0" smtClean="0"/>
-              <a:t> </a:t>
-            </a:r>
-            <a:r>
-              <a:rPr lang="ru-RU" dirty="0" err="1" smtClean="0"/>
-              <a:t>інтерфейсу</a:t>
-            </a:r>
-            <a:r>
-              <a:rPr lang="ru-RU" dirty="0" smtClean="0"/>
-              <a:t>. </a:t>
-            </a:r>
-            <a:r>
-              <a:rPr lang="ru-RU" dirty="0" err="1"/>
-              <a:t>Tailwind</a:t>
-            </a:r>
-            <a:r>
-              <a:rPr lang="ru-RU" dirty="0"/>
-              <a:t> не </a:t>
-            </a:r>
-            <a:r>
-              <a:rPr lang="ru-RU" dirty="0" err="1" smtClean="0"/>
-              <a:t>навязує</a:t>
-            </a:r>
-            <a:r>
-              <a:rPr lang="ru-RU" dirty="0" smtClean="0"/>
-              <a:t> </a:t>
-            </a:r>
-            <a:r>
-              <a:rPr lang="ru-RU" dirty="0" err="1" smtClean="0"/>
-              <a:t>дизайнерські</a:t>
-            </a:r>
-            <a:r>
-              <a:rPr lang="ru-RU" dirty="0" smtClean="0"/>
-              <a:t> </a:t>
-            </a:r>
-            <a:r>
-              <a:rPr lang="ru-RU" dirty="0" err="1" smtClean="0"/>
-              <a:t>рішення</a:t>
-            </a:r>
-            <a:r>
-              <a:rPr lang="ru-RU" dirty="0" smtClean="0"/>
-              <a:t>, </a:t>
-            </a:r>
-            <a:r>
-              <a:rPr lang="ru-RU" dirty="0"/>
-              <a:t>з</a:t>
-            </a:r>
-            <a:r>
-              <a:rPr lang="ru-RU" dirty="0" smtClean="0"/>
-              <a:t> </a:t>
-            </a:r>
-            <a:r>
-              <a:rPr lang="ru-RU" dirty="0" err="1" smtClean="0"/>
-              <a:t>якими</a:t>
-            </a:r>
-            <a:r>
-              <a:rPr lang="ru-RU" dirty="0" smtClean="0"/>
-              <a:t> </a:t>
-            </a:r>
-            <a:r>
-              <a:rPr lang="ru-RU" dirty="0"/>
-              <a:t>вам </a:t>
-            </a:r>
-            <a:r>
-              <a:rPr lang="ru-RU" dirty="0" err="1" smtClean="0"/>
-              <a:t>прийдеться</a:t>
-            </a:r>
-            <a:r>
-              <a:rPr lang="ru-RU" dirty="0" smtClean="0"/>
-              <a:t> </a:t>
-            </a:r>
-            <a:r>
-              <a:rPr lang="ru-RU" dirty="0" err="1" smtClean="0"/>
-              <a:t>боротися</a:t>
-            </a:r>
-            <a:r>
-              <a:rPr lang="ru-RU" dirty="0" smtClean="0"/>
-              <a:t>, </a:t>
-            </a:r>
-            <a:r>
-              <a:rPr lang="ru-RU" dirty="0" err="1" smtClean="0"/>
-              <a:t>щоб</a:t>
-            </a:r>
-            <a:r>
-              <a:rPr lang="ru-RU" dirty="0" smtClean="0"/>
-              <a:t> </a:t>
-            </a:r>
-            <a:r>
-              <a:rPr lang="ru-RU" dirty="0" err="1" smtClean="0"/>
-              <a:t>скасувати</a:t>
-            </a:r>
-            <a:r>
-              <a:rPr lang="ru-RU" dirty="0" smtClean="0"/>
-              <a:t>. </a:t>
-            </a:r>
-            <a:r>
-              <a:rPr lang="ru-RU" dirty="0" err="1" smtClean="0"/>
-              <a:t>Якщо</a:t>
-            </a:r>
-            <a:r>
-              <a:rPr lang="ru-RU" dirty="0" smtClean="0"/>
-              <a:t> </a:t>
-            </a:r>
-            <a:r>
-              <a:rPr lang="ru-RU" dirty="0" err="1" smtClean="0"/>
-              <a:t>ви</a:t>
-            </a:r>
-            <a:r>
-              <a:rPr lang="ru-RU" dirty="0" smtClean="0"/>
-              <a:t> </a:t>
-            </a:r>
-            <a:r>
-              <a:rPr lang="ru-RU" dirty="0" err="1" smtClean="0"/>
-              <a:t>хочите</a:t>
-            </a:r>
-            <a:r>
-              <a:rPr lang="ru-RU" dirty="0" smtClean="0"/>
-              <a:t> </a:t>
-            </a:r>
-            <a:r>
-              <a:rPr lang="ru-RU" dirty="0" err="1" smtClean="0"/>
-              <a:t>успішно</a:t>
-            </a:r>
-            <a:r>
-              <a:rPr lang="ru-RU" dirty="0" smtClean="0"/>
-              <a:t> </a:t>
-            </a:r>
-            <a:r>
-              <a:rPr lang="ru-RU" dirty="0" err="1" smtClean="0"/>
-              <a:t>почати</a:t>
-            </a:r>
-            <a:r>
-              <a:rPr lang="ru-RU" dirty="0" smtClean="0"/>
-              <a:t> </a:t>
-            </a:r>
-            <a:r>
-              <a:rPr lang="ru-RU" dirty="0" err="1" smtClean="0"/>
-              <a:t>реалізацію</a:t>
-            </a:r>
-            <a:r>
-              <a:rPr lang="ru-RU" dirty="0" smtClean="0"/>
-              <a:t> </a:t>
-            </a:r>
-            <a:r>
-              <a:rPr lang="ru-RU" dirty="0" err="1" smtClean="0"/>
-              <a:t>індивідуального</a:t>
-            </a:r>
-            <a:r>
-              <a:rPr lang="ru-RU" dirty="0" smtClean="0"/>
-              <a:t> дизайну, </a:t>
-            </a:r>
-            <a:r>
-              <a:rPr lang="ru-RU" dirty="0"/>
-              <a:t>то </a:t>
-            </a:r>
-            <a:r>
-              <a:rPr lang="ru-RU" dirty="0" err="1"/>
-              <a:t>Tailwind</a:t>
-            </a:r>
-            <a:r>
-              <a:rPr lang="ru-RU" dirty="0"/>
-              <a:t> </a:t>
-            </a:r>
-            <a:r>
-              <a:rPr lang="ru-RU" dirty="0" err="1" smtClean="0"/>
-              <a:t>ідеально</a:t>
-            </a:r>
-            <a:r>
-              <a:rPr lang="ru-RU" dirty="0" smtClean="0"/>
-              <a:t> вам </a:t>
-            </a:r>
-            <a:r>
-              <a:rPr lang="ru-RU" dirty="0" err="1" smtClean="0"/>
-              <a:t>підійде</a:t>
-            </a:r>
-            <a:r>
-              <a:rPr lang="ru-RU" dirty="0" smtClean="0"/>
-              <a:t>. </a:t>
-            </a:r>
-            <a:r>
-              <a:rPr lang="ru-RU" dirty="0"/>
-              <a:t> </a:t>
-            </a:r>
-          </a:p>
-          <a:p>
-            <a:endParaRPr lang="uk-UA" dirty="0"/>
+              <a:rPr lang="en-US" sz="1800" dirty="0"/>
+              <a:t> in that </a:t>
+            </a:r>
+            <a:r>
+              <a:rPr lang="en-US" sz="1800" b="1" dirty="0"/>
+              <a:t>it's not a UI kit.</a:t>
+            </a:r>
+            <a:endParaRPr lang="en-US" sz="1800" dirty="0"/>
+          </a:p>
+          <a:p>
+            <a:r>
+              <a:rPr lang="en-US" sz="1800" dirty="0"/>
+              <a:t>It doesn't have a default theme, and there are no built-in UI components.</a:t>
+            </a:r>
+          </a:p>
+          <a:p>
+            <a:r>
+              <a:rPr lang="en-US" sz="1800" dirty="0"/>
+              <a:t>On the flip side, it also has no opinion about how your site should look and doesn't impose design decisions that you have to fight to undo.</a:t>
+            </a:r>
+          </a:p>
+          <a:p>
+            <a:r>
+              <a:rPr lang="en-US" sz="1800" dirty="0"/>
+              <a:t>If you're looking for a framework that comes with a menu of predesigned widgets to build your site with, Tailwind might not be the right framework for you.</a:t>
+            </a:r>
+          </a:p>
+          <a:p>
+            <a:r>
+              <a:rPr lang="en-US" sz="1800" dirty="0"/>
+              <a:t>But if you want a huge head start implementing a custom design with its own identity, Tailwind might be just what you're looking for.</a:t>
+            </a:r>
+          </a:p>
+          <a:p>
+            <a:endParaRPr lang="uk-UA" sz="1800" dirty="0"/>
           </a:p>
         </p:txBody>
       </p:sp>
@@ -12933,7 +12517,7 @@
         </p:blipFill>
         <p:spPr>
           <a:xfrm>
-            <a:off x="865773" y="4823389"/>
+            <a:off x="685800" y="4823389"/>
             <a:ext cx="6630325" cy="1800476"/>
           </a:xfrm>
           <a:prstGeom prst="rect">
@@ -13035,84 +12619,56 @@
           <a:lstStyle/>
           <a:p>
             <a:r>
-              <a:rPr lang="en-US" dirty="0" smtClean="0"/>
-              <a:t>Material </a:t>
-            </a:r>
-            <a:r>
               <a:rPr lang="en-US" dirty="0"/>
-              <a:t>Design </a:t>
-            </a:r>
-            <a:r>
-              <a:rPr lang="uk-UA" dirty="0"/>
-              <a:t>від </a:t>
+              <a:t>Materialize is a library created with </a:t>
+            </a:r>
+            <a:r>
+              <a:rPr lang="en-US" i="1" dirty="0"/>
+              <a:t>CSS, JavaScript, and HTML</a:t>
             </a:r>
             <a:r>
               <a:rPr lang="en-US" dirty="0"/>
-              <a:t>Google, </a:t>
-            </a:r>
-            <a:r>
-              <a:rPr lang="uk-UA" dirty="0" smtClean="0"/>
-              <a:t>є </a:t>
-            </a:r>
-            <a:r>
-              <a:rPr lang="uk-UA" dirty="0"/>
-              <a:t>мовою дизайну, який поєднує в собі класичні принципи успішного дизайну, а також інновації та технології. Мета </a:t>
+              <a:t> and its components combine classic principles of good design and essential design principles such as </a:t>
+            </a:r>
+            <a:r>
+              <a:rPr lang="en-US" i="1" dirty="0"/>
+              <a:t>browser portability and responsiveness</a:t>
             </a:r>
             <a:r>
               <a:rPr lang="en-US" dirty="0"/>
-              <a:t>Google </a:t>
-            </a:r>
-            <a:r>
-              <a:rPr lang="uk-UA" dirty="0"/>
-              <a:t>полягає в тому, щоб розробити систему, яка забезпечує уніфіковане </a:t>
-            </a:r>
-            <a:r>
-              <a:rPr lang="uk-UA" dirty="0" smtClean="0"/>
-              <a:t>взаємоді</a:t>
-            </a:r>
-            <a:r>
-              <a:rPr lang="uk-UA" dirty="0"/>
-              <a:t>ю</a:t>
-            </a:r>
-            <a:r>
-              <a:rPr lang="uk-UA" dirty="0" smtClean="0"/>
-              <a:t> </a:t>
-            </a:r>
-            <a:r>
-              <a:rPr lang="uk-UA" dirty="0"/>
-              <a:t>з усіма продуктами на будь-якій платформі. </a:t>
+              <a:t>. The framework is </a:t>
+            </a:r>
+            <a:r>
+              <a:rPr lang="en-US" i="1" dirty="0"/>
+              <a:t>extremely light</a:t>
             </a:r>
             <a:r>
               <a:rPr lang="en-US" dirty="0"/>
-              <a:t>Google </a:t>
-            </a:r>
-            <a:r>
-              <a:rPr lang="uk-UA" dirty="0"/>
-              <a:t>виконав неймовірну роботу по просуванню цієї мови дизайну і створив дуже послідовний і елегантний зовнішній вигляд на платформі </a:t>
+              <a:t> at 29kb  and </a:t>
+            </a:r>
+            <a:r>
+              <a:rPr lang="en-US" i="1" dirty="0"/>
+              <a:t>provides built-in features</a:t>
             </a:r>
             <a:r>
               <a:rPr lang="en-US" dirty="0"/>
-              <a:t>Android. </a:t>
-            </a:r>
-            <a:r>
-              <a:rPr lang="uk-UA" dirty="0"/>
-              <a:t>Якщо ви хочете створити веб-сайт з дизайном матеріалів, це правильний шлях. Один з цікавих фактів про </a:t>
+              <a:t> that cover modern support, easy to use features, parallax elements, flow texts, cards, </a:t>
             </a:r>
             <a:r>
               <a:rPr lang="en-US" dirty="0" err="1"/>
-              <a:t>Materialise</a:t>
+              <a:t>hoverable</a:t>
             </a:r>
             <a:r>
               <a:rPr lang="en-US" dirty="0"/>
-              <a:t> - </a:t>
-            </a:r>
-            <a:r>
-              <a:rPr lang="uk-UA" dirty="0"/>
-              <a:t>це те, що він був створений чотирма різними студентами з </a:t>
+              <a:t> items &amp; objects. These features help </a:t>
+            </a:r>
+            <a:r>
+              <a:rPr lang="en-US" i="1" dirty="0"/>
+              <a:t>reduce coding time</a:t>
             </a:r>
             <a:r>
               <a:rPr lang="en-US" dirty="0"/>
-              <a:t>Carnegie Melon.</a:t>
+              <a:t> and is that is a key parameter you are looking for, then Materialize will work. Implementing the Materialize framework is also simple – it can be installed by downloading the materialize.min.css and materialize.min.js files on a local machine and integrating it with the HTML code. For the CDN (Content Delivery Network) based version, the materialize.min.css and materialize.min.js files can be integrated into the HTML code directly from the CDN.</a:t>
             </a:r>
             <a:endParaRPr lang="uk-UA" dirty="0"/>
           </a:p>
@@ -13236,8 +12792,12 @@
           <a:lstStyle/>
           <a:p>
             <a:r>
-              <a:rPr lang="uk-UA" dirty="0" smtClean="0"/>
-              <a:t>Приклади моїх робіт з використанням </a:t>
+              <a:rPr lang="en-US" dirty="0" smtClean="0"/>
+              <a:t>My </a:t>
+            </a:r>
+            <a:r>
+              <a:rPr lang="en-US" dirty="0" smtClean="0"/>
+              <a:t>projects with </a:t>
             </a:r>
             <a:r>
               <a:rPr lang="en-US" dirty="0" smtClean="0"/>
@@ -13325,7 +12885,7 @@
           <p:cNvPr id="2" name="Title 1">
             <a:extLst>
               <a:ext uri="{FF2B5EF4-FFF2-40B4-BE49-F238E27FC236}">
-                <a16:creationId xmlns:a16="http://schemas.microsoft.com/office/drawing/2014/main" xmlns="" id="{8C88C5F5-6CB3-4FAC-992E-C7AF0C1AEAA9}"/>
+                <a16:creationId xmlns="" xmlns:a16="http://schemas.microsoft.com/office/drawing/2014/main" id="{8C88C5F5-6CB3-4FAC-992E-C7AF0C1AEAA9}"/>
               </a:ext>
             </a:extLst>
           </p:cNvPr>
@@ -13342,8 +12902,12 @@
           <a:lstStyle/>
           <a:p>
             <a:r>
-              <a:rPr lang="uk-UA" dirty="0" smtClean="0"/>
-              <a:t>Переваги та недоліки</a:t>
+              <a:rPr lang="en-US" dirty="0" smtClean="0"/>
+              <a:t>Advantages </a:t>
+            </a:r>
+            <a:r>
+              <a:rPr lang="en-US" dirty="0"/>
+              <a:t>and disadvantages</a:t>
             </a:r>
             <a:endParaRPr lang="uk-UA" dirty="0"/>
           </a:p>
@@ -13354,7 +12918,7 @@
           <p:cNvPr id="3" name="Text Placeholder 2">
             <a:extLst>
               <a:ext uri="{FF2B5EF4-FFF2-40B4-BE49-F238E27FC236}">
-                <a16:creationId xmlns:a16="http://schemas.microsoft.com/office/drawing/2014/main" xmlns="" id="{84A8E77E-B539-4F18-9F02-51D8362FC622}"/>
+                <a16:creationId xmlns="" xmlns:a16="http://schemas.microsoft.com/office/drawing/2014/main" id="{84A8E77E-B539-4F18-9F02-51D8362FC622}"/>
               </a:ext>
             </a:extLst>
           </p:cNvPr>
@@ -13365,89 +12929,118 @@
             <p:ph type="body" sz="quarter" idx="10"/>
           </p:nvPr>
         </p:nvSpPr>
-        <p:spPr/>
+        <p:spPr>
+          <a:xfrm>
+            <a:off x="685800" y="1565694"/>
+            <a:ext cx="5174998" cy="3429000"/>
+          </a:xfrm>
+        </p:spPr>
         <p:txBody>
           <a:bodyPr/>
           <a:lstStyle/>
           <a:p>
-            <a:r>
-              <a:rPr lang="uk-UA" dirty="0" smtClean="0"/>
-              <a:t>Переваги</a:t>
-            </a:r>
-            <a:r>
-              <a:rPr lang="en-US" dirty="0" smtClean="0"/>
-              <a:t>:</a:t>
-            </a:r>
-          </a:p>
-          <a:p>
-            <a:pPr marL="285750" indent="-285750">
+            <a:pPr fontAlgn="base"/>
+            <a:r>
+              <a:rPr lang="en-US" sz="2400" dirty="0" smtClean="0"/>
+              <a:t>Advantages:</a:t>
+            </a:r>
+          </a:p>
+          <a:p>
+            <a:pPr marL="342900" indent="-342900" fontAlgn="base">
               <a:buFont typeface="Arial" panose="020B0604020202020204" pitchFamily="34" charset="0"/>
               <a:buChar char="•"/>
             </a:pPr>
             <a:r>
-              <a:rPr lang="uk-UA" sz="1400" dirty="0" smtClean="0"/>
-              <a:t>Адаптивність</a:t>
-            </a:r>
-          </a:p>
-          <a:p>
-            <a:pPr marL="285750" indent="-285750">
+              <a:rPr lang="en-US" dirty="0" smtClean="0"/>
+              <a:t>Fewer </a:t>
+            </a:r>
+            <a:r>
+              <a:rPr lang="en-US" dirty="0"/>
+              <a:t>Cross browser bugs</a:t>
+            </a:r>
+          </a:p>
+          <a:p>
+            <a:pPr marL="342900" indent="-342900" fontAlgn="base">
               <a:buFont typeface="Arial" panose="020B0604020202020204" pitchFamily="34" charset="0"/>
               <a:buChar char="•"/>
             </a:pPr>
             <a:r>
-              <a:rPr lang="uk-UA" sz="1400" dirty="0" smtClean="0"/>
-              <a:t>Зменшення часу на розробку дизайну</a:t>
-            </a:r>
-          </a:p>
-          <a:p>
-            <a:pPr marL="285750" indent="-285750">
+              <a:rPr lang="en-US" dirty="0"/>
+              <a:t>A consistent framework that supports major of all browsers and CSS compatibility fixes</a:t>
+            </a:r>
+          </a:p>
+          <a:p>
+            <a:pPr marL="342900" indent="-342900" fontAlgn="base">
               <a:buFont typeface="Arial" panose="020B0604020202020204" pitchFamily="34" charset="0"/>
               <a:buChar char="•"/>
             </a:pPr>
             <a:r>
-              <a:rPr lang="uk-UA" sz="1400" dirty="0" err="1" smtClean="0"/>
-              <a:t>Кросс-браузерність</a:t>
-            </a:r>
-            <a:endParaRPr lang="uk-UA" sz="1400" dirty="0" smtClean="0"/>
-          </a:p>
-          <a:p>
-            <a:pPr marL="285750" indent="-285750">
+              <a:rPr lang="en-US" dirty="0"/>
+              <a:t>Lightweight and customizable</a:t>
+            </a:r>
+          </a:p>
+          <a:p>
+            <a:pPr marL="342900" indent="-342900" fontAlgn="base">
               <a:buFont typeface="Arial" panose="020B0604020202020204" pitchFamily="34" charset="0"/>
               <a:buChar char="•"/>
             </a:pPr>
             <a:r>
-              <a:rPr lang="uk-UA" sz="1400" dirty="0" smtClean="0"/>
-              <a:t>Легкість в використанні та швидкість </a:t>
-            </a:r>
-            <a:r>
-              <a:rPr lang="uk-UA" sz="1400" dirty="0"/>
-              <a:t>в</a:t>
-            </a:r>
-            <a:r>
-              <a:rPr lang="uk-UA" sz="1400" dirty="0" smtClean="0"/>
-              <a:t> освоєнні</a:t>
-            </a:r>
-          </a:p>
-          <a:p>
-            <a:pPr marL="285750" indent="-285750">
+              <a:rPr lang="en-US" dirty="0"/>
+              <a:t>Responsive structures and styles</a:t>
+            </a:r>
+          </a:p>
+          <a:p>
+            <a:pPr marL="342900" indent="-342900" fontAlgn="base">
               <a:buFont typeface="Arial" panose="020B0604020202020204" pitchFamily="34" charset="0"/>
               <a:buChar char="•"/>
             </a:pPr>
             <a:r>
-              <a:rPr lang="uk-UA" sz="1400" dirty="0" smtClean="0"/>
-              <a:t>Зрозумілий код</a:t>
-            </a:r>
-          </a:p>
-          <a:p>
-            <a:pPr marL="285750" indent="-285750">
+              <a:rPr lang="en-US" dirty="0"/>
+              <a:t>Several JavaScript plugins using the </a:t>
+            </a:r>
+            <a:r>
+              <a:rPr lang="en-US" dirty="0" err="1"/>
+              <a:t>jQuery</a:t>
+            </a:r>
+            <a:endParaRPr lang="en-US" dirty="0"/>
+          </a:p>
+          <a:p>
+            <a:pPr marL="342900" indent="-342900" fontAlgn="base">
               <a:buFont typeface="Arial" panose="020B0604020202020204" pitchFamily="34" charset="0"/>
               <a:buChar char="•"/>
             </a:pPr>
             <a:r>
-              <a:rPr lang="uk-UA" sz="1400" dirty="0" smtClean="0"/>
-              <a:t>Гарно поєднувані стилі</a:t>
-            </a:r>
-            <a:endParaRPr lang="uk-UA" sz="1400" dirty="0"/>
+              <a:rPr lang="en-US" dirty="0"/>
+              <a:t>Good documentation and community support</a:t>
+            </a:r>
+          </a:p>
+          <a:p>
+            <a:pPr marL="342900" indent="-342900" fontAlgn="base">
+              <a:buFont typeface="Arial" panose="020B0604020202020204" pitchFamily="34" charset="0"/>
+              <a:buChar char="•"/>
+            </a:pPr>
+            <a:r>
+              <a:rPr lang="en-US" dirty="0"/>
+              <a:t>Loads of free and professional templates, </a:t>
+            </a:r>
+            <a:r>
+              <a:rPr lang="en-US" dirty="0" err="1"/>
+              <a:t>WordPress</a:t>
+            </a:r>
+            <a:r>
+              <a:rPr lang="en-US" dirty="0"/>
+              <a:t> themes and plugins</a:t>
+            </a:r>
+          </a:p>
+          <a:p>
+            <a:pPr marL="342900" indent="-342900" fontAlgn="base">
+              <a:buFont typeface="Arial" panose="020B0604020202020204" pitchFamily="34" charset="0"/>
+              <a:buChar char="•"/>
+            </a:pPr>
+            <a:r>
+              <a:rPr lang="en-US" dirty="0"/>
+              <a:t>Great grid system</a:t>
+            </a:r>
           </a:p>
         </p:txBody>
       </p:sp>
@@ -13456,7 +13049,7 @@
           <p:cNvPr id="4" name="Text Placeholder 3">
             <a:extLst>
               <a:ext uri="{FF2B5EF4-FFF2-40B4-BE49-F238E27FC236}">
-                <a16:creationId xmlns:a16="http://schemas.microsoft.com/office/drawing/2014/main" xmlns="" id="{7F538B34-5B01-4C18-9A86-345B2E5C88AA}"/>
+                <a16:creationId xmlns="" xmlns:a16="http://schemas.microsoft.com/office/drawing/2014/main" id="{7F538B34-5B01-4C18-9A86-345B2E5C88AA}"/>
               </a:ext>
             </a:extLst>
           </p:cNvPr>
@@ -13467,51 +13060,82 @@
             <p:ph type="body" sz="quarter" idx="11"/>
           </p:nvPr>
         </p:nvSpPr>
-        <p:spPr/>
+        <p:spPr>
+          <a:xfrm>
+            <a:off x="6330696" y="1565694"/>
+            <a:ext cx="5175504" cy="3429000"/>
+          </a:xfrm>
+        </p:spPr>
         <p:txBody>
           <a:bodyPr/>
           <a:lstStyle/>
           <a:p>
             <a:r>
-              <a:rPr lang="uk-UA" dirty="0" smtClean="0"/>
-              <a:t>Недоліки</a:t>
+              <a:rPr lang="en-US" sz="2400" dirty="0" smtClean="0"/>
+              <a:t>Disadvantages</a:t>
             </a:r>
             <a:r>
               <a:rPr lang="en-US" dirty="0" smtClean="0"/>
               <a:t>:</a:t>
             </a:r>
-            <a:endParaRPr lang="uk-UA" dirty="0" smtClean="0"/>
-          </a:p>
-          <a:p>
-            <a:pPr marL="285750" indent="-285750">
+          </a:p>
+          <a:p>
+            <a:pPr marL="285750" indent="-285750" fontAlgn="base">
               <a:buFont typeface="Arial" panose="020B0604020202020204" pitchFamily="34" charset="0"/>
               <a:buChar char="•"/>
             </a:pPr>
             <a:r>
-              <a:rPr lang="uk-UA" sz="1400" dirty="0" smtClean="0"/>
-              <a:t>Шаблонність </a:t>
-            </a:r>
-          </a:p>
-          <a:p>
-            <a:pPr marL="285750" indent="-285750">
+              <a:rPr lang="en-US" sz="1800" dirty="0"/>
+              <a:t>There will be requirement of lots of style overrides or rewriting files that can thus lead to a lot of time spent on designing and coding the website if the design tends to deviate from the customary design used in Bootstrap.</a:t>
+            </a:r>
+          </a:p>
+          <a:p>
+            <a:pPr marL="285750" indent="-285750" fontAlgn="base">
               <a:buFont typeface="Arial" panose="020B0604020202020204" pitchFamily="34" charset="0"/>
               <a:buChar char="•"/>
             </a:pPr>
             <a:r>
-              <a:rPr lang="uk-UA" sz="1400" dirty="0" smtClean="0"/>
-              <a:t>Відсутність гнучкості</a:t>
-            </a:r>
-          </a:p>
-          <a:p>
-            <a:pPr marL="285750" indent="-285750">
+              <a:rPr lang="en-US" sz="1800" dirty="0"/>
+              <a:t>You would have to go the extra mile while creating a design otherwise all the websites will look the same if you don’t do heavy customization.</a:t>
+            </a:r>
+          </a:p>
+          <a:p>
+            <a:pPr marL="285750" indent="-285750" fontAlgn="base">
               <a:buFont typeface="Arial" panose="020B0604020202020204" pitchFamily="34" charset="0"/>
               <a:buChar char="•"/>
             </a:pPr>
             <a:r>
-              <a:rPr lang="uk-UA" sz="1400" dirty="0" smtClean="0"/>
-              <a:t>Старі браузери</a:t>
-            </a:r>
-            <a:endParaRPr lang="uk-UA" sz="1400" dirty="0"/>
+              <a:rPr lang="en-US" sz="1800" dirty="0"/>
+              <a:t>Styles are verbose and can lead to lots of output in HTML which is not needed.</a:t>
+            </a:r>
+          </a:p>
+          <a:p>
+            <a:pPr marL="285750" indent="-285750" fontAlgn="base">
+              <a:buFont typeface="Arial" panose="020B0604020202020204" pitchFamily="34" charset="0"/>
+              <a:buChar char="•"/>
+            </a:pPr>
+            <a:r>
+              <a:rPr lang="en-US" sz="1800" dirty="0"/>
+              <a:t>JavaScript is tied to </a:t>
+            </a:r>
+            <a:r>
+              <a:rPr lang="en-US" sz="1800" dirty="0" err="1"/>
+              <a:t>jQuery</a:t>
+            </a:r>
+            <a:r>
+              <a:rPr lang="en-US" sz="1800" dirty="0"/>
+              <a:t> and is one of the commonest library which thus leaves most of the plugins unused.</a:t>
+            </a:r>
+          </a:p>
+          <a:p>
+            <a:pPr marL="285750" indent="-285750" fontAlgn="base">
+              <a:buFont typeface="Arial" panose="020B0604020202020204" pitchFamily="34" charset="0"/>
+              <a:buChar char="•"/>
+            </a:pPr>
+            <a:r>
+              <a:rPr lang="en-US" sz="1800" dirty="0"/>
+              <a:t>Non-compliant HTML.</a:t>
+            </a:r>
           </a:p>
         </p:txBody>
       </p:sp>
@@ -13621,7 +13245,7 @@
           <p:cNvPr id="4" name="Title 3">
             <a:extLst>
               <a:ext uri="{FF2B5EF4-FFF2-40B4-BE49-F238E27FC236}">
-                <a16:creationId xmlns:a16="http://schemas.microsoft.com/office/drawing/2014/main" xmlns="" id="{9C0E98AF-C5CD-4FAB-A01E-D24E37D15F8E}"/>
+                <a16:creationId xmlns="" xmlns:a16="http://schemas.microsoft.com/office/drawing/2014/main" id="{9C0E98AF-C5CD-4FAB-A01E-D24E37D15F8E}"/>
               </a:ext>
             </a:extLst>
           </p:cNvPr>
@@ -13646,7 +13270,7 @@
           <p:cNvPr id="5" name="Text Placeholder 4">
             <a:extLst>
               <a:ext uri="{FF2B5EF4-FFF2-40B4-BE49-F238E27FC236}">
-                <a16:creationId xmlns:a16="http://schemas.microsoft.com/office/drawing/2014/main" xmlns="" id="{2D815465-9810-4297-B7C7-CB93EFFC3510}"/>
+                <a16:creationId xmlns="" xmlns:a16="http://schemas.microsoft.com/office/drawing/2014/main" id="{2D815465-9810-4297-B7C7-CB93EFFC3510}"/>
               </a:ext>
             </a:extLst>
           </p:cNvPr>
@@ -13668,48 +13292,24 @@
           <a:lstStyle/>
           <a:p>
             <a:r>
-              <a:rPr lang="en-US" b="1" dirty="0"/>
-              <a:t>Bootstrap</a:t>
+              <a:rPr lang="en-US" dirty="0" smtClean="0"/>
+              <a:t>Bootstrap </a:t>
             </a:r>
             <a:r>
               <a:rPr lang="en-US" dirty="0"/>
-              <a:t> — </a:t>
-            </a:r>
-            <a:r>
-              <a:rPr lang="uk-UA" dirty="0"/>
-              <a:t>це безкоштовний набір інструментів з відкритим кодом, призначений для створення веб-сайтів та веб-додатків, який містить шаблони </a:t>
-            </a:r>
+              <a:t>is a free front-end framework for faster and easier web development</a:t>
+            </a:r>
+          </a:p>
+          <a:p>
             <a:r>
               <a:rPr lang="en-US" dirty="0"/>
-              <a:t>CSS </a:t>
-            </a:r>
-            <a:r>
-              <a:rPr lang="uk-UA" dirty="0"/>
-              <a:t>та </a:t>
-            </a:r>
+              <a:t>Bootstrap includes HTML and CSS based design templates for typography, forms, buttons, tables, navigation, modals, image carousels and many other, as well as optional JavaScript plugins</a:t>
+            </a:r>
+          </a:p>
+          <a:p>
             <a:r>
               <a:rPr lang="en-US" dirty="0"/>
-              <a:t>HTML </a:t>
-            </a:r>
-            <a:r>
-              <a:rPr lang="uk-UA" dirty="0"/>
-              <a:t>для </a:t>
-            </a:r>
-            <a:r>
-              <a:rPr lang="uk-UA" dirty="0" err="1"/>
-              <a:t>типографіки</a:t>
-            </a:r>
-            <a:r>
-              <a:rPr lang="uk-UA" dirty="0"/>
-              <a:t>, форм, кнопок, навігації та інших компонентів інтерфейсу, а також додаткові розширення </a:t>
-            </a:r>
-            <a:r>
-              <a:rPr lang="en-US" dirty="0"/>
-              <a:t>JavaScript. </a:t>
-            </a:r>
-            <a:r>
-              <a:rPr lang="uk-UA" dirty="0"/>
-              <a:t>Він спрощує розробку динамічних веб-сайтів і веб-додатків.</a:t>
+              <a:t>Bootstrap also gives you the ability to easily create responsive designs</a:t>
             </a:r>
           </a:p>
         </p:txBody>
@@ -13780,7 +13380,7 @@
           <p:cNvPr id="5" name="Text Placeholder 4">
             <a:extLst>
               <a:ext uri="{FF2B5EF4-FFF2-40B4-BE49-F238E27FC236}">
-                <a16:creationId xmlns:a16="http://schemas.microsoft.com/office/drawing/2014/main" xmlns="" id="{2D815465-9810-4297-B7C7-CB93EFFC3510}"/>
+                <a16:creationId xmlns="" xmlns:a16="http://schemas.microsoft.com/office/drawing/2014/main" id="{2D815465-9810-4297-B7C7-CB93EFFC3510}"/>
               </a:ext>
             </a:extLst>
           </p:cNvPr>
@@ -13794,7 +13394,7 @@
         <p:spPr>
           <a:xfrm>
             <a:off x="659920" y="288985"/>
-            <a:ext cx="10820400" cy="3429000"/>
+            <a:ext cx="10820400" cy="711679"/>
           </a:xfrm>
         </p:spPr>
         <p:txBody>
@@ -13802,30 +13402,25 @@
           <a:lstStyle/>
           <a:p>
             <a:r>
-              <a:rPr lang="uk-UA" dirty="0" smtClean="0"/>
-              <a:t>Для підключення цього </a:t>
-            </a:r>
-            <a:r>
-              <a:rPr lang="uk-UA" dirty="0" err="1" smtClean="0"/>
-              <a:t>фреймворку</a:t>
-            </a:r>
-            <a:r>
-              <a:rPr lang="uk-UA" dirty="0" smtClean="0"/>
-              <a:t> до проекту можна використати </a:t>
-            </a:r>
-            <a:r>
               <a:rPr lang="en-US" dirty="0" smtClean="0"/>
-              <a:t>CDN, </a:t>
-            </a:r>
-            <a:r>
-              <a:rPr lang="uk-UA" dirty="0" smtClean="0"/>
-              <a:t>або ж встановити локально у відповідні папки проекту.</a:t>
+              <a:t>To connect this framework to your </a:t>
+            </a:r>
+            <a:r>
+              <a:rPr lang="en-US" dirty="0"/>
+              <a:t>project </a:t>
             </a:r>
             <a:r>
               <a:rPr lang="en-US" dirty="0" smtClean="0"/>
-              <a:t> </a:t>
-            </a:r>
-            <a:endParaRPr lang="uk-UA" dirty="0"/>
+              <a:t>you </a:t>
+            </a:r>
+            <a:r>
+              <a:rPr lang="en-US" dirty="0"/>
+              <a:t>can use </a:t>
+            </a:r>
+            <a:r>
+              <a:rPr lang="en-US" dirty="0" smtClean="0"/>
+              <a:t>CDN, or download it in folders and add it to your html file.</a:t>
+            </a:r>
           </a:p>
         </p:txBody>
       </p:sp>
@@ -13919,7 +13514,7 @@
           <p:cNvPr id="4" name="Title 3">
             <a:extLst>
               <a:ext uri="{FF2B5EF4-FFF2-40B4-BE49-F238E27FC236}">
-                <a16:creationId xmlns:a16="http://schemas.microsoft.com/office/drawing/2014/main" xmlns="" id="{9C0E98AF-C5CD-4FAB-A01E-D24E37D15F8E}"/>
+                <a16:creationId xmlns="" xmlns:a16="http://schemas.microsoft.com/office/drawing/2014/main" id="{9C0E98AF-C5CD-4FAB-A01E-D24E37D15F8E}"/>
               </a:ext>
             </a:extLst>
           </p:cNvPr>
@@ -13930,14 +13525,19 @@
             <p:ph type="title"/>
           </p:nvPr>
         </p:nvSpPr>
-        <p:spPr/>
+        <p:spPr>
+          <a:xfrm>
+            <a:off x="608163" y="168216"/>
+            <a:ext cx="10820400" cy="685800"/>
+          </a:xfrm>
+        </p:spPr>
         <p:txBody>
           <a:bodyPr/>
           <a:lstStyle/>
           <a:p>
             <a:r>
-              <a:rPr lang="uk-UA" dirty="0" smtClean="0"/>
-              <a:t>Використання</a:t>
+              <a:rPr lang="en-US" dirty="0" smtClean="0"/>
+              <a:t>Usage</a:t>
             </a:r>
             <a:endParaRPr lang="uk-UA" dirty="0"/>
           </a:p>
@@ -13948,7 +13548,7 @@
           <p:cNvPr id="5" name="Text Placeholder 4">
             <a:extLst>
               <a:ext uri="{FF2B5EF4-FFF2-40B4-BE49-F238E27FC236}">
-                <a16:creationId xmlns:a16="http://schemas.microsoft.com/office/drawing/2014/main" xmlns="" id="{2D815465-9810-4297-B7C7-CB93EFFC3510}"/>
+                <a16:creationId xmlns="" xmlns:a16="http://schemas.microsoft.com/office/drawing/2014/main" id="{2D815465-9810-4297-B7C7-CB93EFFC3510}"/>
               </a:ext>
             </a:extLst>
           </p:cNvPr>
@@ -13961,7 +13561,7 @@
         </p:nvSpPr>
         <p:spPr>
           <a:xfrm>
-            <a:off x="685800" y="1496683"/>
+            <a:off x="608163" y="854016"/>
             <a:ext cx="10820400" cy="3429000"/>
           </a:xfrm>
         </p:spPr>
@@ -13970,34 +13570,38 @@
           <a:lstStyle/>
           <a:p>
             <a:r>
-              <a:rPr lang="uk-UA" dirty="0" smtClean="0"/>
-              <a:t>Необхідно задати потрібні класи для </a:t>
+              <a:rPr lang="en-US" dirty="0"/>
+              <a:t>Bootstrap requires the use of the HTML5 </a:t>
+            </a:r>
+            <a:r>
+              <a:rPr lang="en-US" dirty="0" err="1"/>
+              <a:t>doctype</a:t>
+            </a:r>
+            <a:r>
+              <a:rPr lang="en-US" dirty="0"/>
+              <a:t>. Without it, you’ll see some funky incomplete styling, but including it shouldn’t cause any considerable hiccups</a:t>
             </a:r>
             <a:r>
               <a:rPr lang="en-US" dirty="0" smtClean="0"/>
-              <a:t>html </a:t>
-            </a:r>
-            <a:r>
-              <a:rPr lang="uk-UA" dirty="0" smtClean="0"/>
-              <a:t>елемента, тим самим </a:t>
-            </a:r>
-            <a:r>
-              <a:rPr lang="uk-UA" dirty="0" err="1" smtClean="0"/>
-              <a:t>кастомізувавши</a:t>
-            </a:r>
-            <a:r>
-              <a:rPr lang="uk-UA" dirty="0" smtClean="0"/>
-              <a:t> його під стилі, які пропонує нам цей </a:t>
-            </a:r>
-            <a:r>
-              <a:rPr lang="uk-UA" dirty="0" err="1" smtClean="0"/>
-              <a:t>фреймворк</a:t>
-            </a:r>
-            <a:r>
-              <a:rPr lang="uk-UA" dirty="0" smtClean="0"/>
               <a:t>.</a:t>
             </a:r>
+          </a:p>
+          <a:p>
+            <a:r>
+              <a:rPr lang="en-US" dirty="0"/>
+              <a:t>Bootstrap is developed mobile first, a strategy in which we optimize code for mobile devices first and then scale up components as necessary using CSS media queries. To ensure proper rendering and touch zooming for all devices, add the responsive viewport meta tag to your &lt;head</a:t>
+            </a:r>
+            <a:r>
+              <a:rPr lang="en-US" dirty="0" smtClean="0"/>
+              <a:t>&gt;.</a:t>
+            </a:r>
             <a:endParaRPr lang="uk-UA" dirty="0"/>
+          </a:p>
+          <a:p>
+            <a:r>
+              <a:rPr lang="en-US" dirty="0" smtClean="0"/>
+              <a:t>You need to add class names to your html tags to add styles.</a:t>
+            </a:r>
           </a:p>
         </p:txBody>
       </p:sp>
@@ -14017,8 +13621,8 @@
         </p:blipFill>
         <p:spPr>
           <a:xfrm>
-            <a:off x="685800" y="2329132"/>
-            <a:ext cx="6508328" cy="4128867"/>
+            <a:off x="345056" y="3201269"/>
+            <a:ext cx="5572362" cy="3535093"/>
           </a:xfrm>
           <a:prstGeom prst="rect">
             <a:avLst/>
@@ -14041,7 +13645,7 @@
         </p:blipFill>
         <p:spPr>
           <a:xfrm>
-            <a:off x="3300172" y="2329132"/>
+            <a:off x="2478322" y="3286664"/>
             <a:ext cx="8396442" cy="1345721"/>
           </a:xfrm>
           <a:prstGeom prst="rect">
@@ -14237,7 +13841,7 @@
           <p:cNvPr id="4" name="Title 3">
             <a:extLst>
               <a:ext uri="{FF2B5EF4-FFF2-40B4-BE49-F238E27FC236}">
-                <a16:creationId xmlns:a16="http://schemas.microsoft.com/office/drawing/2014/main" xmlns="" id="{9C0E98AF-C5CD-4FAB-A01E-D24E37D15F8E}"/>
+                <a16:creationId xmlns="" xmlns:a16="http://schemas.microsoft.com/office/drawing/2014/main" id="{9C0E98AF-C5CD-4FAB-A01E-D24E37D15F8E}"/>
               </a:ext>
             </a:extLst>
           </p:cNvPr>
@@ -14262,7 +13866,7 @@
           <p:cNvPr id="5" name="Text Placeholder 4">
             <a:extLst>
               <a:ext uri="{FF2B5EF4-FFF2-40B4-BE49-F238E27FC236}">
-                <a16:creationId xmlns:a16="http://schemas.microsoft.com/office/drawing/2014/main" xmlns="" id="{2D815465-9810-4297-B7C7-CB93EFFC3510}"/>
+                <a16:creationId xmlns="" xmlns:a16="http://schemas.microsoft.com/office/drawing/2014/main" id="{2D815465-9810-4297-B7C7-CB93EFFC3510}"/>
               </a:ext>
             </a:extLst>
           </p:cNvPr>
@@ -14348,7 +13952,7 @@
           <p:cNvPr id="4" name="Title 3">
             <a:extLst>
               <a:ext uri="{FF2B5EF4-FFF2-40B4-BE49-F238E27FC236}">
-                <a16:creationId xmlns:a16="http://schemas.microsoft.com/office/drawing/2014/main" xmlns="" id="{9C0E98AF-C5CD-4FAB-A01E-D24E37D15F8E}"/>
+                <a16:creationId xmlns="" xmlns:a16="http://schemas.microsoft.com/office/drawing/2014/main" id="{9C0E98AF-C5CD-4FAB-A01E-D24E37D15F8E}"/>
               </a:ext>
             </a:extLst>
           </p:cNvPr>
@@ -14365,12 +13969,8 @@
           <a:lstStyle/>
           <a:p>
             <a:r>
-              <a:rPr lang="uk-UA" dirty="0" smtClean="0"/>
-              <a:t>Чи є конкуренти</a:t>
-            </a:r>
-            <a:r>
               <a:rPr lang="en-US" dirty="0" smtClean="0"/>
-              <a:t>?</a:t>
+              <a:t>Another popular frameworks</a:t>
             </a:r>
             <a:endParaRPr lang="uk-UA" dirty="0"/>
           </a:p>
@@ -14545,7 +14145,7 @@
         </p:nvSpPr>
         <p:spPr>
           <a:xfrm>
-            <a:off x="595222" y="1166183"/>
+            <a:off x="379562" y="796394"/>
             <a:ext cx="5378570" cy="3429000"/>
           </a:xfrm>
         </p:spPr>
@@ -14553,243 +14153,97 @@
           <a:bodyPr/>
           <a:lstStyle/>
           <a:p>
-            <a:r>
-              <a:rPr lang="uk-UA" dirty="0" smtClean="0"/>
-              <a:t>Безкоштовний </a:t>
-            </a:r>
-            <a:r>
-              <a:rPr lang="en-US" dirty="0" err="1" smtClean="0"/>
-              <a:t>css</a:t>
-            </a:r>
-            <a:r>
-              <a:rPr lang="en-US" dirty="0" smtClean="0"/>
-              <a:t> </a:t>
-            </a:r>
-            <a:r>
-              <a:rPr lang="uk-UA" dirty="0" smtClean="0"/>
-              <a:t> </a:t>
-            </a:r>
-            <a:r>
-              <a:rPr lang="uk-UA" dirty="0" err="1" smtClean="0"/>
-              <a:t>фреймворк</a:t>
-            </a:r>
-            <a:r>
-              <a:rPr lang="uk-UA" dirty="0" smtClean="0"/>
-              <a:t> оснований на основі</a:t>
-            </a:r>
-            <a:r>
-              <a:rPr lang="en-US" dirty="0" smtClean="0"/>
-              <a:t> </a:t>
-            </a:r>
-            <a:r>
-              <a:rPr lang="en-US" dirty="0" err="1" smtClean="0"/>
-              <a:t>flexbox</a:t>
-            </a:r>
-            <a:r>
-              <a:rPr lang="uk-UA" dirty="0" smtClean="0"/>
-              <a:t> . Основною перевагою є те, що це чистий </a:t>
-            </a:r>
-            <a:r>
-              <a:rPr lang="en-US" dirty="0" smtClean="0"/>
-              <a:t>CSS</a:t>
-            </a:r>
-            <a:r>
-              <a:rPr lang="uk-UA" dirty="0" smtClean="0"/>
-              <a:t>.</a:t>
-            </a:r>
-          </a:p>
-          <a:p>
-            <a:r>
-              <a:rPr lang="uk-UA" dirty="0" smtClean="0"/>
-              <a:t>Переваги</a:t>
-            </a:r>
-            <a:r>
-              <a:rPr lang="en-US" dirty="0" smtClean="0"/>
-              <a:t>: </a:t>
-            </a:r>
-          </a:p>
-          <a:p>
-            <a:pPr marL="342900" indent="-342900">
+            <a:pPr marL="285750" indent="-285750">
               <a:buFont typeface="Arial" panose="020B0604020202020204" pitchFamily="34" charset="0"/>
               <a:buChar char="•"/>
             </a:pPr>
             <a:r>
-              <a:rPr lang="ru-RU" dirty="0"/>
-              <a:t>BULMA на </a:t>
-            </a:r>
-            <a:r>
-              <a:rPr lang="ru-RU" dirty="0" err="1" smtClean="0"/>
-              <a:t>основі</a:t>
-            </a:r>
-            <a:r>
-              <a:rPr lang="ru-RU" dirty="0" smtClean="0"/>
-              <a:t> </a:t>
-            </a:r>
-            <a:r>
-              <a:rPr lang="ru-RU" dirty="0" err="1" smtClean="0"/>
-              <a:t>Flexbox</a:t>
-            </a:r>
-            <a:r>
-              <a:rPr lang="en-US" dirty="0" smtClean="0"/>
-              <a:t>;</a:t>
-            </a:r>
-            <a:endParaRPr lang="ru-RU" dirty="0"/>
-          </a:p>
-          <a:p>
-            <a:pPr marL="342900" indent="-342900">
+              <a:rPr lang="en-US" sz="1800" dirty="0" err="1"/>
+              <a:t>Responsivity</a:t>
+            </a:r>
+            <a:r>
+              <a:rPr lang="en-US" sz="1800" dirty="0"/>
+              <a:t>: The framework is mobile-first and works similarly to the popular Bootstrap CSS.</a:t>
+            </a:r>
+          </a:p>
+          <a:p>
+            <a:pPr marL="285750" indent="-285750">
               <a:buFont typeface="Arial" panose="020B0604020202020204" pitchFamily="34" charset="0"/>
               <a:buChar char="•"/>
             </a:pPr>
             <a:r>
-              <a:rPr lang="ru-RU" dirty="0" err="1" smtClean="0"/>
-              <a:t>Побудований</a:t>
-            </a:r>
-            <a:r>
-              <a:rPr lang="ru-RU" dirty="0" smtClean="0"/>
-              <a:t> </a:t>
-            </a:r>
-            <a:r>
-              <a:rPr lang="ru-RU" dirty="0"/>
-              <a:t>з</a:t>
-            </a:r>
-            <a:r>
-              <a:rPr lang="ru-RU" dirty="0" smtClean="0"/>
-              <a:t> </a:t>
-            </a:r>
-            <a:r>
-              <a:rPr lang="ru-RU" dirty="0" err="1"/>
-              <a:t>Sass</a:t>
-            </a:r>
-            <a:r>
-              <a:rPr lang="ru-RU" dirty="0"/>
-              <a:t>, </a:t>
-            </a:r>
-            <a:r>
-              <a:rPr lang="ru-RU" dirty="0" smtClean="0"/>
-              <a:t>тому </a:t>
-            </a:r>
-            <a:r>
-              <a:rPr lang="ru-RU" dirty="0" err="1" smtClean="0"/>
-              <a:t>можна</a:t>
-            </a:r>
-            <a:r>
-              <a:rPr lang="ru-RU" dirty="0" smtClean="0"/>
-              <a:t> </a:t>
-            </a:r>
-            <a:r>
-              <a:rPr lang="ru-RU" dirty="0" err="1" smtClean="0"/>
-              <a:t>імпортувати</a:t>
-            </a:r>
-            <a:r>
-              <a:rPr lang="ru-RU" dirty="0" smtClean="0"/>
-              <a:t> </a:t>
-            </a:r>
-            <a:r>
-              <a:rPr lang="ru-RU" dirty="0"/>
-              <a:t>все, </a:t>
-            </a:r>
-            <a:r>
-              <a:rPr lang="ru-RU" dirty="0" err="1" smtClean="0"/>
-              <a:t>що</a:t>
-            </a:r>
-            <a:r>
-              <a:rPr lang="ru-RU" dirty="0"/>
-              <a:t> </a:t>
-            </a:r>
-            <a:r>
-              <a:rPr lang="ru-RU" dirty="0" smtClean="0"/>
-              <a:t>вам </a:t>
-            </a:r>
-            <a:r>
-              <a:rPr lang="ru-RU" dirty="0" err="1" smtClean="0"/>
-              <a:t>необхідно</a:t>
-            </a:r>
-            <a:r>
-              <a:rPr lang="en-US" dirty="0" smtClean="0"/>
-              <a:t>;</a:t>
-            </a:r>
-            <a:endParaRPr lang="ru-RU" dirty="0"/>
-          </a:p>
-          <a:p>
-            <a:pPr marL="342900" indent="-342900">
+              <a:rPr lang="en-US" sz="1800" dirty="0"/>
+              <a:t>Well-documented: Often a very important component for developers, </a:t>
+            </a:r>
+            <a:r>
+              <a:rPr lang="en-US" sz="1800" dirty="0" err="1"/>
+              <a:t>Bulma</a:t>
+            </a:r>
+            <a:r>
+              <a:rPr lang="en-US" sz="1800" dirty="0"/>
+              <a:t> is very well documented, and comes with an active community of people ready to help with projects.</a:t>
+            </a:r>
+          </a:p>
+          <a:p>
+            <a:pPr marL="285750" indent="-285750">
               <a:buFont typeface="Arial" panose="020B0604020202020204" pitchFamily="34" charset="0"/>
               <a:buChar char="•"/>
             </a:pPr>
             <a:r>
-              <a:rPr lang="ru-RU" dirty="0"/>
-              <a:t>“</a:t>
-            </a:r>
-            <a:r>
-              <a:rPr lang="ru-RU" dirty="0" err="1"/>
-              <a:t>Fully</a:t>
-            </a:r>
-            <a:r>
-              <a:rPr lang="ru-RU" dirty="0"/>
-              <a:t> </a:t>
-            </a:r>
-            <a:r>
-              <a:rPr lang="ru-RU" dirty="0" err="1"/>
-              <a:t>responsive</a:t>
-            </a:r>
-            <a:r>
-              <a:rPr lang="ru-RU" dirty="0"/>
-              <a:t>” </a:t>
-            </a:r>
-            <a:r>
-              <a:rPr lang="ru-RU" dirty="0" smtClean="0"/>
-              <a:t>і </a:t>
-            </a:r>
-            <a:r>
-              <a:rPr lang="ru-RU" dirty="0"/>
-              <a:t>в </a:t>
-            </a:r>
-            <a:r>
-              <a:rPr lang="ru-RU" dirty="0" smtClean="0"/>
-              <a:t>першу </a:t>
-            </a:r>
-            <a:r>
-              <a:rPr lang="ru-RU" dirty="0" err="1" smtClean="0"/>
-              <a:t>чергу</a:t>
-            </a:r>
-            <a:r>
-              <a:rPr lang="ru-RU" dirty="0" smtClean="0"/>
-              <a:t> </a:t>
-            </a:r>
-            <a:r>
-              <a:rPr lang="ru-RU" dirty="0"/>
-              <a:t>— </a:t>
-            </a:r>
-            <a:r>
-              <a:rPr lang="ru-RU" dirty="0" err="1" smtClean="0"/>
-              <a:t>дуже</a:t>
-            </a:r>
-            <a:r>
-              <a:rPr lang="ru-RU" dirty="0" smtClean="0"/>
-              <a:t> </a:t>
-            </a:r>
-            <a:r>
-              <a:rPr lang="ru-RU" dirty="0" err="1" smtClean="0"/>
-              <a:t>корисний</a:t>
-            </a:r>
-            <a:r>
-              <a:rPr lang="ru-RU" dirty="0" smtClean="0"/>
-              <a:t> для </a:t>
-            </a:r>
-            <a:r>
-              <a:rPr lang="ru-RU" dirty="0" err="1" smtClean="0"/>
-              <a:t>мобільної</a:t>
-            </a:r>
-            <a:r>
-              <a:rPr lang="ru-RU" dirty="0" smtClean="0"/>
-              <a:t> верстки</a:t>
-            </a:r>
-            <a:r>
-              <a:rPr lang="ru-RU" dirty="0"/>
-              <a:t>.</a:t>
-            </a:r>
-          </a:p>
-          <a:p>
-            <a:endParaRPr lang="uk-UA" dirty="0"/>
+              <a:rPr lang="en-US" sz="1800" dirty="0"/>
+              <a:t>Solid foundation: </a:t>
+            </a:r>
+            <a:r>
+              <a:rPr lang="en-US" sz="1800" dirty="0" err="1"/>
+              <a:t>Bulma</a:t>
+            </a:r>
+            <a:r>
+              <a:rPr lang="en-US" sz="1800" dirty="0"/>
+              <a:t> comes packed with all of the goods you would expect from a CSS framework, including diverse typography, buttons, forms, tables, and more.</a:t>
+            </a:r>
+          </a:p>
+          <a:p>
+            <a:pPr marL="285750" indent="-285750">
+              <a:buFont typeface="Arial" panose="020B0604020202020204" pitchFamily="34" charset="0"/>
+              <a:buChar char="•"/>
+            </a:pPr>
+            <a:r>
+              <a:rPr lang="en-US" sz="1800" dirty="0"/>
+              <a:t>Various components: </a:t>
+            </a:r>
+            <a:r>
+              <a:rPr lang="en-US" sz="1800" dirty="0" err="1"/>
+              <a:t>Bulma</a:t>
+            </a:r>
+            <a:r>
+              <a:rPr lang="en-US" sz="1800" dirty="0"/>
+              <a:t> is packed with a vertical alignment solution, layouts, and various media objects.</a:t>
+            </a:r>
+          </a:p>
+          <a:p>
+            <a:pPr marL="285750" indent="-285750">
+              <a:buFont typeface="Arial" panose="020B0604020202020204" pitchFamily="34" charset="0"/>
+              <a:buChar char="•"/>
+            </a:pPr>
+            <a:r>
+              <a:rPr lang="en-US" sz="1800" dirty="0"/>
+              <a:t>Modular: The </a:t>
+            </a:r>
+            <a:r>
+              <a:rPr lang="en-US" sz="1800" dirty="0" err="1"/>
+              <a:t>Bulma</a:t>
+            </a:r>
+            <a:r>
+              <a:rPr lang="en-US" sz="1800" dirty="0"/>
+              <a:t> setup is built with Sass, which means that you can design your framework step by step with only the features you need.</a:t>
+            </a:r>
+          </a:p>
+          <a:p>
+            <a:pPr marL="285750" indent="-285750">
+              <a:buFont typeface="Arial" panose="020B0604020202020204" pitchFamily="34" charset="0"/>
+              <a:buChar char="•"/>
+            </a:pPr>
+            <a:endParaRPr lang="uk-UA" sz="1800" dirty="0"/>
           </a:p>
         </p:txBody>
       </p:sp>
@@ -14833,7 +14287,7 @@
         </p:blipFill>
         <p:spPr>
           <a:xfrm>
-            <a:off x="595222" y="5340612"/>
+            <a:off x="1725282" y="5262975"/>
             <a:ext cx="7602747" cy="1245526"/>
           </a:xfrm>
           <a:prstGeom prst="rect">
@@ -15743,20 +15197,20 @@
 </file>
 
 <file path=customXml/item1.xml><?xml version="1.0" encoding="utf-8"?>
-<p:properties xmlns:p="http://schemas.microsoft.com/office/2006/metadata/properties" xmlns:xsi="http://www.w3.org/2001/XMLSchema-instance" xmlns:pc="http://schemas.microsoft.com/office/infopath/2007/PartnerControls">
-  <documentManagement>
-    <_x041a__x043e__x043c__x0435__x0442__x0430__x0440_ xmlns="835f28f2-30f1-4728-84d2-86d96e143488" xsi:nil="true"/>
-  </documentManagement>
-</p:properties>
-</file>
-
-<file path=customXml/item2.xml><?xml version="1.0" encoding="utf-8"?>
 <?mso-contentType ?>
 <FormTemplates xmlns="http://schemas.microsoft.com/sharepoint/v3/contenttype/forms">
   <Display>DocumentLibraryForm</Display>
   <Edit>DocumentLibraryForm</Edit>
   <New>DocumentLibraryForm</New>
 </FormTemplates>
+</file>
+
+<file path=customXml/item2.xml><?xml version="1.0" encoding="utf-8"?>
+<p:properties xmlns:p="http://schemas.microsoft.com/office/2006/metadata/properties" xmlns:xsi="http://www.w3.org/2001/XMLSchema-instance" xmlns:pc="http://schemas.microsoft.com/office/infopath/2007/PartnerControls">
+  <documentManagement>
+    <_x041a__x043e__x043c__x0435__x0442__x0430__x0440_ xmlns="835f28f2-30f1-4728-84d2-86d96e143488" xsi:nil="true"/>
+  </documentManagement>
+</p:properties>
 </file>
 
 <file path=customXml/item3.xml><?xml version="1.0" encoding="utf-8"?>
@@ -15985,6 +15439,14 @@
 </file>
 
 <file path=customXml/itemProps1.xml><?xml version="1.0" encoding="utf-8"?>
+<ds:datastoreItem xmlns:ds="http://schemas.openxmlformats.org/officeDocument/2006/customXml" ds:itemID="{296B3B9E-03D8-4766-BF45-6129617CF026}">
+  <ds:schemaRefs>
+    <ds:schemaRef ds:uri="http://schemas.microsoft.com/sharepoint/v3/contenttype/forms"/>
+  </ds:schemaRefs>
+</ds:datastoreItem>
+</file>
+
+<file path=customXml/itemProps2.xml><?xml version="1.0" encoding="utf-8"?>
 <ds:datastoreItem xmlns:ds="http://schemas.openxmlformats.org/officeDocument/2006/customXml" ds:itemID="{E9033E08-7FE9-4F6D-B155-A8777B4A5A57}">
   <ds:schemaRefs>
     <ds:schemaRef ds:uri="http://schemas.openxmlformats.org/package/2006/metadata/core-properties"/>
@@ -15997,14 +15459,6 @@
     <ds:schemaRef ds:uri="341e6018-ac0a-4dfb-8409-db9e0d25502e"/>
     <ds:schemaRef ds:uri="http://www.w3.org/XML/1998/namespace"/>
     <ds:schemaRef ds:uri="http://purl.org/dc/dcmitype/"/>
-  </ds:schemaRefs>
-</ds:datastoreItem>
-</file>
-
-<file path=customXml/itemProps2.xml><?xml version="1.0" encoding="utf-8"?>
-<ds:datastoreItem xmlns:ds="http://schemas.openxmlformats.org/officeDocument/2006/customXml" ds:itemID="{296B3B9E-03D8-4766-BF45-6129617CF026}">
-  <ds:schemaRefs>
-    <ds:schemaRef ds:uri="http://schemas.microsoft.com/sharepoint/v3/contenttype/forms"/>
   </ds:schemaRefs>
 </ds:datastoreItem>
 </file>

</xml_diff>